<commit_message>
presentation and readme updated
</commit_message>
<xml_diff>
--- a/1984.pptx
+++ b/1984.pptx
@@ -8,9 +8,12 @@
     <p:sldId id="256" r:id="rId2"/>
     <p:sldId id="257" r:id="rId3"/>
     <p:sldId id="261" r:id="rId4"/>
-    <p:sldId id="260" r:id="rId5"/>
-    <p:sldId id="258" r:id="rId6"/>
-    <p:sldId id="259" r:id="rId7"/>
+    <p:sldId id="263" r:id="rId5"/>
+    <p:sldId id="264" r:id="rId6"/>
+    <p:sldId id="265" r:id="rId7"/>
+    <p:sldId id="258" r:id="rId8"/>
+    <p:sldId id="262" r:id="rId9"/>
+    <p:sldId id="259" r:id="rId10"/>
   </p:sldIdLst>
   <p:sldSz cx="9144000" cy="6858000" type="screen4x3"/>
   <p:notesSz cx="6858000" cy="9144000"/>
@@ -248,7 +251,7 @@
           <a:p>
             <a:fld id="{40DB9BA8-657E-47B3-9EA0-F6AA772F6C5A}" type="datetimeFigureOut">
               <a:rPr lang="ru-RU" smtClean="0"/>
-              <a:t>10.01.2022</a:t>
+              <a:t>13.01.2022</a:t>
             </a:fld>
             <a:endParaRPr lang="ru-RU"/>
           </a:p>
@@ -453,7 +456,7 @@
           <a:p>
             <a:fld id="{40DB9BA8-657E-47B3-9EA0-F6AA772F6C5A}" type="datetimeFigureOut">
               <a:rPr lang="ru-RU" smtClean="0"/>
-              <a:t>10.01.2022</a:t>
+              <a:t>13.01.2022</a:t>
             </a:fld>
             <a:endParaRPr lang="ru-RU"/>
           </a:p>
@@ -633,7 +636,7 @@
           <a:p>
             <a:fld id="{40DB9BA8-657E-47B3-9EA0-F6AA772F6C5A}" type="datetimeFigureOut">
               <a:rPr lang="ru-RU" smtClean="0"/>
-              <a:t>10.01.2022</a:t>
+              <a:t>13.01.2022</a:t>
             </a:fld>
             <a:endParaRPr lang="ru-RU"/>
           </a:p>
@@ -803,7 +806,7 @@
           <a:p>
             <a:fld id="{40DB9BA8-657E-47B3-9EA0-F6AA772F6C5A}" type="datetimeFigureOut">
               <a:rPr lang="ru-RU" smtClean="0"/>
-              <a:t>10.01.2022</a:t>
+              <a:t>13.01.2022</a:t>
             </a:fld>
             <a:endParaRPr lang="ru-RU"/>
           </a:p>
@@ -1047,7 +1050,7 @@
           <a:p>
             <a:fld id="{40DB9BA8-657E-47B3-9EA0-F6AA772F6C5A}" type="datetimeFigureOut">
               <a:rPr lang="ru-RU" smtClean="0"/>
-              <a:t>10.01.2022</a:t>
+              <a:t>13.01.2022</a:t>
             </a:fld>
             <a:endParaRPr lang="ru-RU"/>
           </a:p>
@@ -1279,7 +1282,7 @@
           <a:p>
             <a:fld id="{40DB9BA8-657E-47B3-9EA0-F6AA772F6C5A}" type="datetimeFigureOut">
               <a:rPr lang="ru-RU" smtClean="0"/>
-              <a:t>10.01.2022</a:t>
+              <a:t>13.01.2022</a:t>
             </a:fld>
             <a:endParaRPr lang="ru-RU"/>
           </a:p>
@@ -1646,7 +1649,7 @@
           <a:p>
             <a:fld id="{40DB9BA8-657E-47B3-9EA0-F6AA772F6C5A}" type="datetimeFigureOut">
               <a:rPr lang="ru-RU" smtClean="0"/>
-              <a:t>10.01.2022</a:t>
+              <a:t>13.01.2022</a:t>
             </a:fld>
             <a:endParaRPr lang="ru-RU"/>
           </a:p>
@@ -1764,7 +1767,7 @@
           <a:p>
             <a:fld id="{40DB9BA8-657E-47B3-9EA0-F6AA772F6C5A}" type="datetimeFigureOut">
               <a:rPr lang="ru-RU" smtClean="0"/>
-              <a:t>10.01.2022</a:t>
+              <a:t>13.01.2022</a:t>
             </a:fld>
             <a:endParaRPr lang="ru-RU"/>
           </a:p>
@@ -1859,7 +1862,7 @@
           <a:p>
             <a:fld id="{40DB9BA8-657E-47B3-9EA0-F6AA772F6C5A}" type="datetimeFigureOut">
               <a:rPr lang="ru-RU" smtClean="0"/>
-              <a:t>10.01.2022</a:t>
+              <a:t>13.01.2022</a:t>
             </a:fld>
             <a:endParaRPr lang="ru-RU"/>
           </a:p>
@@ -2136,7 +2139,7 @@
           <a:p>
             <a:fld id="{40DB9BA8-657E-47B3-9EA0-F6AA772F6C5A}" type="datetimeFigureOut">
               <a:rPr lang="ru-RU" smtClean="0"/>
-              <a:t>10.01.2022</a:t>
+              <a:t>13.01.2022</a:t>
             </a:fld>
             <a:endParaRPr lang="ru-RU"/>
           </a:p>
@@ -2393,7 +2396,7 @@
           <a:p>
             <a:fld id="{40DB9BA8-657E-47B3-9EA0-F6AA772F6C5A}" type="datetimeFigureOut">
               <a:rPr lang="ru-RU" smtClean="0"/>
-              <a:t>10.01.2022</a:t>
+              <a:t>13.01.2022</a:t>
             </a:fld>
             <a:endParaRPr lang="ru-RU"/>
           </a:p>
@@ -2606,7 +2609,7 @@
           <a:p>
             <a:fld id="{40DB9BA8-657E-47B3-9EA0-F6AA772F6C5A}" type="datetimeFigureOut">
               <a:rPr lang="ru-RU" smtClean="0"/>
-              <a:t>10.01.2022</a:t>
+              <a:t>13.01.2022</a:t>
             </a:fld>
             <a:endParaRPr lang="ru-RU"/>
           </a:p>
@@ -3388,7 +3391,7 @@
         <p:spPr>
           <a:xfrm>
             <a:off x="407391" y="963405"/>
-            <a:ext cx="9010301" cy="3416320"/>
+            <a:ext cx="9010301" cy="1477328"/>
           </a:xfrm>
           <a:prstGeom prst="rect">
             <a:avLst/>
@@ -3427,53 +3430,44 @@
           <a:p>
             <a:endParaRPr lang="ru-RU" dirty="0"/>
           </a:p>
-          <a:p>
-            <a:pPr marL="285750" indent="-285750">
-              <a:buFont typeface="Arial" panose="020B0604020202020204" pitchFamily="34" charset="0"/>
-              <a:buChar char="•"/>
-            </a:pPr>
-            <a:r>
-              <a:rPr lang="ru-RU" dirty="0"/>
-              <a:t>Передвижение игрока</a:t>
-            </a:r>
-          </a:p>
-          <a:p>
-            <a:r>
-              <a:rPr lang="ru-RU" dirty="0"/>
-              <a:t>     </a:t>
-            </a:r>
-          </a:p>
-          <a:p>
-            <a:r>
-              <a:rPr lang="ru-RU" dirty="0"/>
-              <a:t>	Передвижение игрока осуществляется с помощью стрелок. При передвижении у   	игрока появляется анимация бега.  </a:t>
-            </a:r>
-          </a:p>
-          <a:p>
-            <a:endParaRPr lang="ru-RU" dirty="0"/>
-          </a:p>
-          <a:p>
-            <a:pPr marL="285750" indent="-285750">
-              <a:buFont typeface="Arial" panose="020B0604020202020204" pitchFamily="34" charset="0"/>
-              <a:buChar char="•"/>
-            </a:pPr>
-            <a:r>
-              <a:rPr lang="ru-RU" dirty="0"/>
-              <a:t>Битва с противниками</a:t>
-            </a:r>
-          </a:p>
-          <a:p>
-            <a:pPr marL="285750" indent="-285750">
-              <a:buFont typeface="Arial" panose="020B0604020202020204" pitchFamily="34" charset="0"/>
-              <a:buChar char="•"/>
-            </a:pPr>
-            <a:r>
-              <a:rPr lang="ru-RU" dirty="0"/>
-              <a:t>Бонусы на уровнях</a:t>
-            </a:r>
-          </a:p>
-        </p:txBody>
-      </p:sp>
+        </p:txBody>
+      </p:sp>
+      <p:pic>
+        <p:nvPicPr>
+          <p:cNvPr id="4" name="Рисунок 3">
+            <a:extLst>
+              <a:ext uri="{FF2B5EF4-FFF2-40B4-BE49-F238E27FC236}">
+                <a16:creationId xmlns:a16="http://schemas.microsoft.com/office/drawing/2014/main" id="{E836A762-BAAC-4B3F-8159-3AEEDEBB7281}"/>
+              </a:ext>
+            </a:extLst>
+          </p:cNvPr>
+          <p:cNvPicPr>
+            <a:picLocks noChangeAspect="1"/>
+          </p:cNvPicPr>
+          <p:nvPr/>
+        </p:nvPicPr>
+        <p:blipFill>
+          <a:blip r:embed="rId2">
+            <a:extLst>
+              <a:ext uri="{28A0092B-C50C-407E-A947-70E740481C1C}">
+                <a14:useLocalDpi xmlns:a14="http://schemas.microsoft.com/office/drawing/2010/main" val="0"/>
+              </a:ext>
+            </a:extLst>
+          </a:blip>
+          <a:stretch>
+            <a:fillRect/>
+          </a:stretch>
+        </p:blipFill>
+        <p:spPr>
+          <a:xfrm>
+            <a:off x="1713958" y="2732631"/>
+            <a:ext cx="5716084" cy="2854438"/>
+          </a:xfrm>
+          <a:prstGeom prst="rect">
+            <a:avLst/>
+          </a:prstGeom>
+        </p:spPr>
+      </p:pic>
     </p:spTree>
     <p:extLst>
       <p:ext uri="{BB962C8B-B14F-4D97-AF65-F5344CB8AC3E}">
@@ -3506,41 +3500,172 @@
       </p:grpSpPr>
       <p:sp>
         <p:nvSpPr>
-          <p:cNvPr id="2" name="Заголовок 1">
+          <p:cNvPr id="3" name="Прямоугольник 2">
             <a:extLst>
               <a:ext uri="{FF2B5EF4-FFF2-40B4-BE49-F238E27FC236}">
-                <a16:creationId xmlns:a16="http://schemas.microsoft.com/office/drawing/2014/main" id="{3BE02F32-043C-415D-AA61-C088DF9C19B4}"/>
+                <a16:creationId xmlns:a16="http://schemas.microsoft.com/office/drawing/2014/main" id="{8554EE51-8C21-4BB5-BC97-4841CBA9A5CB}"/>
               </a:ext>
             </a:extLst>
           </p:cNvPr>
-          <p:cNvSpPr>
-            <a:spLocks noGrp="1"/>
-          </p:cNvSpPr>
-          <p:nvPr>
-            <p:ph type="title"/>
-          </p:nvPr>
-        </p:nvSpPr>
-        <p:spPr>
-          <a:xfrm>
-            <a:off x="628650" y="365127"/>
-            <a:ext cx="7886700" cy="909492"/>
-          </a:xfrm>
-        </p:spPr>
-        <p:txBody>
-          <a:bodyPr/>
-          <a:lstStyle/>
-          <a:p>
+          <p:cNvSpPr/>
+          <p:nvPr/>
+        </p:nvSpPr>
+        <p:spPr>
+          <a:xfrm>
+            <a:off x="695761" y="1585011"/>
+            <a:ext cx="8040848" cy="375552"/>
+          </a:xfrm>
+          <a:prstGeom prst="rect">
+            <a:avLst/>
+          </a:prstGeom>
+        </p:spPr>
+        <p:txBody>
+          <a:bodyPr wrap="square">
+            <a:spAutoFit/>
+          </a:bodyPr>
+          <a:lstStyle/>
+          <a:p>
+            <a:pPr>
+              <a:lnSpc>
+                <a:spcPct val="107000"/>
+              </a:lnSpc>
+              <a:spcAft>
+                <a:spcPts val="800"/>
+              </a:spcAft>
+            </a:pPr>
+            <a:endParaRPr lang="ru-RU" dirty="0">
+              <a:latin typeface="Calibri" panose="020F0502020204030204" pitchFamily="34" charset="0"/>
+              <a:ea typeface="Calibri" panose="020F0502020204030204" pitchFamily="34" charset="0"/>
+              <a:cs typeface="Times New Roman" panose="02020603050405020304" pitchFamily="18" charset="0"/>
+            </a:endParaRPr>
+          </a:p>
+        </p:txBody>
+      </p:sp>
+      <p:sp>
+        <p:nvSpPr>
+          <p:cNvPr id="7" name="Прямоугольник 6">
+            <a:extLst>
+              <a:ext uri="{FF2B5EF4-FFF2-40B4-BE49-F238E27FC236}">
+                <a16:creationId xmlns:a16="http://schemas.microsoft.com/office/drawing/2014/main" id="{EFC45789-81CB-4556-A9EA-32BE631B09B5}"/>
+              </a:ext>
+            </a:extLst>
+          </p:cNvPr>
+          <p:cNvSpPr/>
+          <p:nvPr/>
+        </p:nvSpPr>
+        <p:spPr>
+          <a:xfrm>
+            <a:off x="407391" y="384682"/>
+            <a:ext cx="9010301" cy="1200329"/>
+          </a:xfrm>
+          <a:prstGeom prst="rect">
+            <a:avLst/>
+          </a:prstGeom>
+        </p:spPr>
+        <p:txBody>
+          <a:bodyPr wrap="square">
+            <a:spAutoFit/>
+          </a:bodyPr>
+          <a:lstStyle/>
+          <a:p>
+            <a:pPr marL="285750" indent="-285750">
+              <a:buFont typeface="Arial" panose="020B0604020202020204" pitchFamily="34" charset="0"/>
+              <a:buChar char="•"/>
+            </a:pPr>
             <a:r>
               <a:rPr lang="ru-RU" dirty="0"/>
-              <a:t>Структура программы</a:t>
-            </a:r>
-          </a:p>
-        </p:txBody>
-      </p:sp>
+              <a:t>Передвижение игрока</a:t>
+            </a:r>
+          </a:p>
+          <a:p>
+            <a:r>
+              <a:rPr lang="ru-RU" dirty="0"/>
+              <a:t>     </a:t>
+            </a:r>
+          </a:p>
+          <a:p>
+            <a:r>
+              <a:rPr lang="ru-RU" dirty="0"/>
+              <a:t>	Передвижение игрока осуществляется с помощью стрелок. При передвижении у   	игрока появляется анимация бега.  </a:t>
+            </a:r>
+          </a:p>
+        </p:txBody>
+      </p:sp>
+      <p:pic>
+        <p:nvPicPr>
+          <p:cNvPr id="14" name="Рисунок 13">
+            <a:extLst>
+              <a:ext uri="{FF2B5EF4-FFF2-40B4-BE49-F238E27FC236}">
+                <a16:creationId xmlns:a16="http://schemas.microsoft.com/office/drawing/2014/main" id="{3A50BFF3-008A-4EE3-8782-076127EBB636}"/>
+              </a:ext>
+            </a:extLst>
+          </p:cNvPr>
+          <p:cNvPicPr>
+            <a:picLocks noChangeAspect="1"/>
+          </p:cNvPicPr>
+          <p:nvPr/>
+        </p:nvPicPr>
+        <p:blipFill>
+          <a:blip r:embed="rId2">
+            <a:extLst>
+              <a:ext uri="{28A0092B-C50C-407E-A947-70E740481C1C}">
+                <a14:useLocalDpi xmlns:a14="http://schemas.microsoft.com/office/drawing/2010/main" val="0"/>
+              </a:ext>
+            </a:extLst>
+          </a:blip>
+          <a:stretch>
+            <a:fillRect/>
+          </a:stretch>
+        </p:blipFill>
+        <p:spPr>
+          <a:xfrm>
+            <a:off x="1574596" y="2232695"/>
+            <a:ext cx="5810250" cy="647700"/>
+          </a:xfrm>
+          <a:prstGeom prst="rect">
+            <a:avLst/>
+          </a:prstGeom>
+        </p:spPr>
+      </p:pic>
+      <p:pic>
+        <p:nvPicPr>
+          <p:cNvPr id="16" name="Рисунок 15">
+            <a:extLst>
+              <a:ext uri="{FF2B5EF4-FFF2-40B4-BE49-F238E27FC236}">
+                <a16:creationId xmlns:a16="http://schemas.microsoft.com/office/drawing/2014/main" id="{E4E00E22-17B1-43E3-925A-07F90870FF9C}"/>
+              </a:ext>
+            </a:extLst>
+          </p:cNvPr>
+          <p:cNvPicPr>
+            <a:picLocks noChangeAspect="1"/>
+          </p:cNvPicPr>
+          <p:nvPr/>
+        </p:nvPicPr>
+        <p:blipFill rotWithShape="1">
+          <a:blip r:embed="rId3">
+            <a:extLst>
+              <a:ext uri="{28A0092B-C50C-407E-A947-70E740481C1C}">
+                <a14:useLocalDpi xmlns:a14="http://schemas.microsoft.com/office/drawing/2010/main" val="0"/>
+              </a:ext>
+            </a:extLst>
+          </a:blip>
+          <a:srcRect l="48043" t="39022" r="6293" b="52905"/>
+          <a:stretch/>
+        </p:blipFill>
+        <p:spPr>
+          <a:xfrm>
+            <a:off x="1677796" y="3405580"/>
+            <a:ext cx="5646425" cy="998290"/>
+          </a:xfrm>
+          <a:prstGeom prst="rect">
+            <a:avLst/>
+          </a:prstGeom>
+        </p:spPr>
+      </p:pic>
     </p:spTree>
     <p:extLst>
       <p:ext uri="{BB962C8B-B14F-4D97-AF65-F5344CB8AC3E}">
-        <p14:creationId xmlns:p14="http://schemas.microsoft.com/office/powerpoint/2010/main" val="2482173116"/>
+        <p14:creationId xmlns:p14="http://schemas.microsoft.com/office/powerpoint/2010/main" val="2965798364"/>
       </p:ext>
     </p:extLst>
   </p:cSld>
@@ -3569,6 +3694,483 @@
       </p:grpSpPr>
       <p:sp>
         <p:nvSpPr>
+          <p:cNvPr id="3" name="Прямоугольник 2">
+            <a:extLst>
+              <a:ext uri="{FF2B5EF4-FFF2-40B4-BE49-F238E27FC236}">
+                <a16:creationId xmlns:a16="http://schemas.microsoft.com/office/drawing/2014/main" id="{8554EE51-8C21-4BB5-BC97-4841CBA9A5CB}"/>
+              </a:ext>
+            </a:extLst>
+          </p:cNvPr>
+          <p:cNvSpPr/>
+          <p:nvPr/>
+        </p:nvSpPr>
+        <p:spPr>
+          <a:xfrm>
+            <a:off x="695761" y="1585011"/>
+            <a:ext cx="8040848" cy="375552"/>
+          </a:xfrm>
+          <a:prstGeom prst="rect">
+            <a:avLst/>
+          </a:prstGeom>
+        </p:spPr>
+        <p:txBody>
+          <a:bodyPr wrap="square">
+            <a:spAutoFit/>
+          </a:bodyPr>
+          <a:lstStyle/>
+          <a:p>
+            <a:pPr>
+              <a:lnSpc>
+                <a:spcPct val="107000"/>
+              </a:lnSpc>
+              <a:spcAft>
+                <a:spcPts val="800"/>
+              </a:spcAft>
+            </a:pPr>
+            <a:endParaRPr lang="ru-RU" dirty="0">
+              <a:latin typeface="Calibri" panose="020F0502020204030204" pitchFamily="34" charset="0"/>
+              <a:ea typeface="Calibri" panose="020F0502020204030204" pitchFamily="34" charset="0"/>
+              <a:cs typeface="Times New Roman" panose="02020603050405020304" pitchFamily="18" charset="0"/>
+            </a:endParaRPr>
+          </a:p>
+        </p:txBody>
+      </p:sp>
+      <p:sp>
+        <p:nvSpPr>
+          <p:cNvPr id="7" name="Прямоугольник 6">
+            <a:extLst>
+              <a:ext uri="{FF2B5EF4-FFF2-40B4-BE49-F238E27FC236}">
+                <a16:creationId xmlns:a16="http://schemas.microsoft.com/office/drawing/2014/main" id="{EFC45789-81CB-4556-A9EA-32BE631B09B5}"/>
+              </a:ext>
+            </a:extLst>
+          </p:cNvPr>
+          <p:cNvSpPr/>
+          <p:nvPr/>
+        </p:nvSpPr>
+        <p:spPr>
+          <a:xfrm>
+            <a:off x="407391" y="384682"/>
+            <a:ext cx="9010301" cy="1754326"/>
+          </a:xfrm>
+          <a:prstGeom prst="rect">
+            <a:avLst/>
+          </a:prstGeom>
+        </p:spPr>
+        <p:txBody>
+          <a:bodyPr wrap="square">
+            <a:spAutoFit/>
+          </a:bodyPr>
+          <a:lstStyle/>
+          <a:p>
+            <a:pPr marL="285750" indent="-285750">
+              <a:buFont typeface="Arial" panose="020B0604020202020204" pitchFamily="34" charset="0"/>
+              <a:buChar char="•"/>
+            </a:pPr>
+            <a:r>
+              <a:rPr lang="ru-RU" dirty="0"/>
+              <a:t>Битва с противниками</a:t>
+            </a:r>
+            <a:endParaRPr lang="en-US" dirty="0"/>
+          </a:p>
+          <a:p>
+            <a:r>
+              <a:rPr lang="en-US" dirty="0"/>
+              <a:t>	</a:t>
+            </a:r>
+          </a:p>
+          <a:p>
+            <a:r>
+              <a:rPr lang="en-US" dirty="0"/>
+              <a:t>	</a:t>
+            </a:r>
+            <a:r>
+              <a:rPr lang="ru-RU" dirty="0"/>
+              <a:t>Цель каждого уровня – сразиться с каждым противником и победить их. Противниками являются роботы.</a:t>
+            </a:r>
+            <a:endParaRPr lang="en-US" dirty="0"/>
+          </a:p>
+          <a:p>
+            <a:r>
+              <a:rPr lang="ru-RU" dirty="0"/>
+              <a:t>     </a:t>
+            </a:r>
+          </a:p>
+          <a:p>
+            <a:r>
+              <a:rPr lang="ru-RU" dirty="0"/>
+              <a:t>	</a:t>
+            </a:r>
+          </a:p>
+        </p:txBody>
+      </p:sp>
+      <p:pic>
+        <p:nvPicPr>
+          <p:cNvPr id="6" name="Рисунок 5">
+            <a:extLst>
+              <a:ext uri="{FF2B5EF4-FFF2-40B4-BE49-F238E27FC236}">
+                <a16:creationId xmlns:a16="http://schemas.microsoft.com/office/drawing/2014/main" id="{DE881C10-E6B3-47B9-9D9F-3C1874BA4A5B}"/>
+              </a:ext>
+            </a:extLst>
+          </p:cNvPr>
+          <p:cNvPicPr>
+            <a:picLocks noChangeAspect="1"/>
+          </p:cNvPicPr>
+          <p:nvPr/>
+        </p:nvPicPr>
+        <p:blipFill rotWithShape="1">
+          <a:blip r:embed="rId2">
+            <a:extLst>
+              <a:ext uri="{28A0092B-C50C-407E-A947-70E740481C1C}">
+                <a14:useLocalDpi xmlns:a14="http://schemas.microsoft.com/office/drawing/2010/main" val="0"/>
+              </a:ext>
+            </a:extLst>
+          </a:blip>
+          <a:srcRect l="17608" r="68208" b="80473"/>
+          <a:stretch/>
+        </p:blipFill>
+        <p:spPr>
+          <a:xfrm>
+            <a:off x="1098432" y="1960562"/>
+            <a:ext cx="2235473" cy="2936875"/>
+          </a:xfrm>
+          <a:prstGeom prst="rect">
+            <a:avLst/>
+          </a:prstGeom>
+        </p:spPr>
+      </p:pic>
+      <p:pic>
+        <p:nvPicPr>
+          <p:cNvPr id="8" name="Рисунок 7">
+            <a:extLst>
+              <a:ext uri="{FF2B5EF4-FFF2-40B4-BE49-F238E27FC236}">
+                <a16:creationId xmlns:a16="http://schemas.microsoft.com/office/drawing/2014/main" id="{85D1A284-0CA7-4D75-A14B-48C7F67D750D}"/>
+              </a:ext>
+            </a:extLst>
+          </p:cNvPr>
+          <p:cNvPicPr>
+            <a:picLocks noChangeAspect="1"/>
+          </p:cNvPicPr>
+          <p:nvPr/>
+        </p:nvPicPr>
+        <p:blipFill rotWithShape="1">
+          <a:blip r:embed="rId3">
+            <a:extLst>
+              <a:ext uri="{28A0092B-C50C-407E-A947-70E740481C1C}">
+                <a14:useLocalDpi xmlns:a14="http://schemas.microsoft.com/office/drawing/2010/main" val="0"/>
+              </a:ext>
+            </a:extLst>
+          </a:blip>
+          <a:srcRect l="62857" t="25594" r="1438" b="49656"/>
+          <a:stretch/>
+        </p:blipFill>
+        <p:spPr>
+          <a:xfrm>
+            <a:off x="4730941" y="2405182"/>
+            <a:ext cx="2894752" cy="2313811"/>
+          </a:xfrm>
+          <a:prstGeom prst="rect">
+            <a:avLst/>
+          </a:prstGeom>
+        </p:spPr>
+      </p:pic>
+    </p:spTree>
+    <p:extLst>
+      <p:ext uri="{BB962C8B-B14F-4D97-AF65-F5344CB8AC3E}">
+        <p14:creationId xmlns:p14="http://schemas.microsoft.com/office/powerpoint/2010/main" val="3117732224"/>
+      </p:ext>
+    </p:extLst>
+  </p:cSld>
+  <p:clrMapOvr>
+    <a:masterClrMapping/>
+  </p:clrMapOvr>
+</p:sld>
+</file>
+
+<file path=ppt/slides/slide6.xml><?xml version="1.0" encoding="utf-8"?>
+<p:sld xmlns:a="http://schemas.openxmlformats.org/drawingml/2006/main" xmlns:r="http://schemas.openxmlformats.org/officeDocument/2006/relationships" xmlns:p="http://schemas.openxmlformats.org/presentationml/2006/main">
+  <p:cSld>
+    <p:spTree>
+      <p:nvGrpSpPr>
+        <p:cNvPr id="1" name=""/>
+        <p:cNvGrpSpPr/>
+        <p:nvPr/>
+      </p:nvGrpSpPr>
+      <p:grpSpPr>
+        <a:xfrm>
+          <a:off x="0" y="0"/>
+          <a:ext cx="0" cy="0"/>
+          <a:chOff x="0" y="0"/>
+          <a:chExt cx="0" cy="0"/>
+        </a:xfrm>
+      </p:grpSpPr>
+      <p:sp>
+        <p:nvSpPr>
+          <p:cNvPr id="3" name="Прямоугольник 2">
+            <a:extLst>
+              <a:ext uri="{FF2B5EF4-FFF2-40B4-BE49-F238E27FC236}">
+                <a16:creationId xmlns:a16="http://schemas.microsoft.com/office/drawing/2014/main" id="{8554EE51-8C21-4BB5-BC97-4841CBA9A5CB}"/>
+              </a:ext>
+            </a:extLst>
+          </p:cNvPr>
+          <p:cNvSpPr/>
+          <p:nvPr/>
+        </p:nvSpPr>
+        <p:spPr>
+          <a:xfrm>
+            <a:off x="695761" y="1585011"/>
+            <a:ext cx="8040848" cy="375552"/>
+          </a:xfrm>
+          <a:prstGeom prst="rect">
+            <a:avLst/>
+          </a:prstGeom>
+        </p:spPr>
+        <p:txBody>
+          <a:bodyPr wrap="square">
+            <a:spAutoFit/>
+          </a:bodyPr>
+          <a:lstStyle/>
+          <a:p>
+            <a:pPr>
+              <a:lnSpc>
+                <a:spcPct val="107000"/>
+              </a:lnSpc>
+              <a:spcAft>
+                <a:spcPts val="800"/>
+              </a:spcAft>
+            </a:pPr>
+            <a:endParaRPr lang="ru-RU" dirty="0">
+              <a:latin typeface="Calibri" panose="020F0502020204030204" pitchFamily="34" charset="0"/>
+              <a:ea typeface="Calibri" panose="020F0502020204030204" pitchFamily="34" charset="0"/>
+              <a:cs typeface="Times New Roman" panose="02020603050405020304" pitchFamily="18" charset="0"/>
+            </a:endParaRPr>
+          </a:p>
+        </p:txBody>
+      </p:sp>
+      <p:sp>
+        <p:nvSpPr>
+          <p:cNvPr id="7" name="Прямоугольник 6">
+            <a:extLst>
+              <a:ext uri="{FF2B5EF4-FFF2-40B4-BE49-F238E27FC236}">
+                <a16:creationId xmlns:a16="http://schemas.microsoft.com/office/drawing/2014/main" id="{EFC45789-81CB-4556-A9EA-32BE631B09B5}"/>
+              </a:ext>
+            </a:extLst>
+          </p:cNvPr>
+          <p:cNvSpPr/>
+          <p:nvPr/>
+        </p:nvSpPr>
+        <p:spPr>
+          <a:xfrm>
+            <a:off x="407392" y="384682"/>
+            <a:ext cx="8329218" cy="1200329"/>
+          </a:xfrm>
+          <a:prstGeom prst="rect">
+            <a:avLst/>
+          </a:prstGeom>
+        </p:spPr>
+        <p:txBody>
+          <a:bodyPr wrap="square">
+            <a:spAutoFit/>
+          </a:bodyPr>
+          <a:lstStyle/>
+          <a:p>
+            <a:pPr marL="285750" indent="-285750">
+              <a:buFont typeface="Arial" panose="020B0604020202020204" pitchFamily="34" charset="0"/>
+              <a:buChar char="•"/>
+            </a:pPr>
+            <a:r>
+              <a:rPr lang="ru-RU" dirty="0"/>
+              <a:t>Бонусы на уровнях</a:t>
+            </a:r>
+          </a:p>
+          <a:p>
+            <a:r>
+              <a:rPr lang="ru-RU" dirty="0"/>
+              <a:t>     </a:t>
+            </a:r>
+          </a:p>
+          <a:p>
+            <a:r>
+              <a:rPr lang="ru-RU" dirty="0"/>
+              <a:t>	На уровнях игрок может собирать различные бонусы. Одни будут добавлять ему очки, другие – восстанавливать здоровье.</a:t>
+            </a:r>
+          </a:p>
+        </p:txBody>
+      </p:sp>
+      <p:pic>
+        <p:nvPicPr>
+          <p:cNvPr id="4" name="Рисунок 3">
+            <a:extLst>
+              <a:ext uri="{FF2B5EF4-FFF2-40B4-BE49-F238E27FC236}">
+                <a16:creationId xmlns:a16="http://schemas.microsoft.com/office/drawing/2014/main" id="{6B9CEFE4-6864-448C-B630-7A61B2418F81}"/>
+              </a:ext>
+            </a:extLst>
+          </p:cNvPr>
+          <p:cNvPicPr>
+            <a:picLocks noChangeAspect="1"/>
+          </p:cNvPicPr>
+          <p:nvPr/>
+        </p:nvPicPr>
+        <p:blipFill>
+          <a:blip r:embed="rId2">
+            <a:extLst>
+              <a:ext uri="{28A0092B-C50C-407E-A947-70E740481C1C}">
+                <a14:useLocalDpi xmlns:a14="http://schemas.microsoft.com/office/drawing/2010/main" val="0"/>
+              </a:ext>
+            </a:extLst>
+          </a:blip>
+          <a:stretch>
+            <a:fillRect/>
+          </a:stretch>
+        </p:blipFill>
+        <p:spPr>
+          <a:xfrm>
+            <a:off x="1797692" y="2340878"/>
+            <a:ext cx="1088122" cy="1088122"/>
+          </a:xfrm>
+          <a:prstGeom prst="rect">
+            <a:avLst/>
+          </a:prstGeom>
+        </p:spPr>
+      </p:pic>
+      <p:sp>
+        <p:nvSpPr>
+          <p:cNvPr id="5" name="TextBox 4">
+            <a:extLst>
+              <a:ext uri="{FF2B5EF4-FFF2-40B4-BE49-F238E27FC236}">
+                <a16:creationId xmlns:a16="http://schemas.microsoft.com/office/drawing/2014/main" id="{E1D806E7-CA29-4244-8C56-1EFEEBA34A0C}"/>
+              </a:ext>
+            </a:extLst>
+          </p:cNvPr>
+          <p:cNvSpPr txBox="1"/>
+          <p:nvPr/>
+        </p:nvSpPr>
+        <p:spPr>
+          <a:xfrm>
+            <a:off x="1821997" y="3613666"/>
+            <a:ext cx="1063817" cy="369332"/>
+          </a:xfrm>
+          <a:prstGeom prst="rect">
+            <a:avLst/>
+          </a:prstGeom>
+          <a:noFill/>
+        </p:spPr>
+        <p:txBody>
+          <a:bodyPr wrap="none" rtlCol="0">
+            <a:spAutoFit/>
+          </a:bodyPr>
+          <a:lstStyle/>
+          <a:p>
+            <a:r>
+              <a:rPr lang="ru-RU" dirty="0"/>
+              <a:t>Монетки</a:t>
+            </a:r>
+          </a:p>
+        </p:txBody>
+      </p:sp>
+      <p:pic>
+        <p:nvPicPr>
+          <p:cNvPr id="8" name="Рисунок 7">
+            <a:extLst>
+              <a:ext uri="{FF2B5EF4-FFF2-40B4-BE49-F238E27FC236}">
+                <a16:creationId xmlns:a16="http://schemas.microsoft.com/office/drawing/2014/main" id="{447A3CD3-08AE-49A1-8491-A022B81E0209}"/>
+              </a:ext>
+            </a:extLst>
+          </p:cNvPr>
+          <p:cNvPicPr>
+            <a:picLocks noChangeAspect="1"/>
+          </p:cNvPicPr>
+          <p:nvPr/>
+        </p:nvPicPr>
+        <p:blipFill>
+          <a:blip r:embed="rId3">
+            <a:extLst>
+              <a:ext uri="{28A0092B-C50C-407E-A947-70E740481C1C}">
+                <a14:useLocalDpi xmlns:a14="http://schemas.microsoft.com/office/drawing/2010/main" val="0"/>
+              </a:ext>
+            </a:extLst>
+          </a:blip>
+          <a:stretch>
+            <a:fillRect/>
+          </a:stretch>
+        </p:blipFill>
+        <p:spPr>
+          <a:xfrm>
+            <a:off x="5716746" y="2281276"/>
+            <a:ext cx="1207325" cy="1207325"/>
+          </a:xfrm>
+          <a:prstGeom prst="rect">
+            <a:avLst/>
+          </a:prstGeom>
+        </p:spPr>
+      </p:pic>
+      <p:sp>
+        <p:nvSpPr>
+          <p:cNvPr id="9" name="TextBox 8">
+            <a:extLst>
+              <a:ext uri="{FF2B5EF4-FFF2-40B4-BE49-F238E27FC236}">
+                <a16:creationId xmlns:a16="http://schemas.microsoft.com/office/drawing/2014/main" id="{08753003-8ACA-4A1F-AF00-020F52F87613}"/>
+              </a:ext>
+            </a:extLst>
+          </p:cNvPr>
+          <p:cNvSpPr txBox="1"/>
+          <p:nvPr/>
+        </p:nvSpPr>
+        <p:spPr>
+          <a:xfrm>
+            <a:off x="5930719" y="3613666"/>
+            <a:ext cx="779381" cy="369332"/>
+          </a:xfrm>
+          <a:prstGeom prst="rect">
+            <a:avLst/>
+          </a:prstGeom>
+          <a:noFill/>
+        </p:spPr>
+        <p:txBody>
+          <a:bodyPr wrap="none" rtlCol="0">
+            <a:spAutoFit/>
+          </a:bodyPr>
+          <a:lstStyle/>
+          <a:p>
+            <a:r>
+              <a:rPr lang="ru-RU" dirty="0" err="1"/>
+              <a:t>Хилки</a:t>
+            </a:r>
+            <a:endParaRPr lang="ru-RU" dirty="0"/>
+          </a:p>
+        </p:txBody>
+      </p:sp>
+    </p:spTree>
+    <p:extLst>
+      <p:ext uri="{BB962C8B-B14F-4D97-AF65-F5344CB8AC3E}">
+        <p14:creationId xmlns:p14="http://schemas.microsoft.com/office/powerpoint/2010/main" val="1699347804"/>
+      </p:ext>
+    </p:extLst>
+  </p:cSld>
+  <p:clrMapOvr>
+    <a:masterClrMapping/>
+  </p:clrMapOvr>
+</p:sld>
+</file>
+
+<file path=ppt/slides/slide7.xml><?xml version="1.0" encoding="utf-8"?>
+<p:sld xmlns:a="http://schemas.openxmlformats.org/drawingml/2006/main" xmlns:r="http://schemas.openxmlformats.org/officeDocument/2006/relationships" xmlns:p="http://schemas.openxmlformats.org/presentationml/2006/main">
+  <p:cSld>
+    <p:spTree>
+      <p:nvGrpSpPr>
+        <p:cNvPr id="1" name=""/>
+        <p:cNvGrpSpPr/>
+        <p:nvPr/>
+      </p:nvGrpSpPr>
+      <p:grpSpPr>
+        <a:xfrm>
+          <a:off x="0" y="0"/>
+          <a:ext cx="0" cy="0"/>
+          <a:chOff x="0" y="0"/>
+          <a:chExt cx="0" cy="0"/>
+        </a:xfrm>
+      </p:grpSpPr>
+      <p:sp>
+        <p:nvSpPr>
           <p:cNvPr id="2" name="Заголовок 1">
             <a:extLst>
               <a:ext uri="{FF2B5EF4-FFF2-40B4-BE49-F238E27FC236}">
@@ -3651,7 +4253,7 @@
 </p:sld>
 </file>
 
-<file path=ppt/slides/slide6.xml><?xml version="1.0" encoding="utf-8"?>
+<file path=ppt/slides/slide8.xml><?xml version="1.0" encoding="utf-8"?>
 <p:sld xmlns:a="http://schemas.openxmlformats.org/drawingml/2006/main" xmlns:r="http://schemas.openxmlformats.org/officeDocument/2006/relationships" xmlns:p="http://schemas.openxmlformats.org/presentationml/2006/main">
   <p:cSld>
     <p:spTree>
@@ -3692,6 +4294,227 @@
         </p:spPr>
         <p:txBody>
           <a:bodyPr>
+            <a:normAutofit fontScale="90000"/>
+          </a:bodyPr>
+          <a:lstStyle/>
+          <a:p>
+            <a:r>
+              <a:rPr lang="ru-RU" dirty="0"/>
+              <a:t>Дальнейшее развитие:</a:t>
+            </a:r>
+            <a:br>
+              <a:rPr lang="ru-RU" dirty="0"/>
+            </a:br>
+            <a:endParaRPr lang="ru-RU" dirty="0"/>
+          </a:p>
+        </p:txBody>
+      </p:sp>
+      <p:sp>
+        <p:nvSpPr>
+          <p:cNvPr id="3" name="TextBox 2">
+            <a:extLst>
+              <a:ext uri="{FF2B5EF4-FFF2-40B4-BE49-F238E27FC236}">
+                <a16:creationId xmlns:a16="http://schemas.microsoft.com/office/drawing/2014/main" id="{7D89BA5C-F6DB-4FD8-9161-74DC34C4369C}"/>
+              </a:ext>
+            </a:extLst>
+          </p:cNvPr>
+          <p:cNvSpPr txBox="1"/>
+          <p:nvPr/>
+        </p:nvSpPr>
+        <p:spPr>
+          <a:xfrm>
+            <a:off x="628650" y="1082180"/>
+            <a:ext cx="6729406" cy="4247317"/>
+          </a:xfrm>
+          <a:prstGeom prst="rect">
+            <a:avLst/>
+          </a:prstGeom>
+          <a:noFill/>
+        </p:spPr>
+        <p:txBody>
+          <a:bodyPr wrap="none" rtlCol="0">
+            <a:spAutoFit/>
+          </a:bodyPr>
+          <a:lstStyle/>
+          <a:p>
+            <a:pPr marL="285750" indent="-285750">
+              <a:buFont typeface="Arial" panose="020B0604020202020204" pitchFamily="34" charset="0"/>
+              <a:buChar char="•"/>
+            </a:pPr>
+            <a:r>
+              <a:rPr lang="ru-RU" dirty="0"/>
+              <a:t>Добавить возможность кастомизации игрока</a:t>
+            </a:r>
+          </a:p>
+          <a:p>
+            <a:pPr marL="285750" indent="-285750">
+              <a:buFont typeface="Arial" panose="020B0604020202020204" pitchFamily="34" charset="0"/>
+              <a:buChar char="•"/>
+            </a:pPr>
+            <a:endParaRPr lang="ru-RU" dirty="0"/>
+          </a:p>
+          <a:p>
+            <a:pPr marL="285750" indent="-285750">
+              <a:buFont typeface="Arial" panose="020B0604020202020204" pitchFamily="34" charset="0"/>
+              <a:buChar char="•"/>
+            </a:pPr>
+            <a:r>
+              <a:rPr lang="ru-RU" dirty="0"/>
+              <a:t>Добавить больше уровней</a:t>
+            </a:r>
+          </a:p>
+          <a:p>
+            <a:pPr marL="285750" indent="-285750">
+              <a:buFont typeface="Arial" panose="020B0604020202020204" pitchFamily="34" charset="0"/>
+              <a:buChar char="•"/>
+            </a:pPr>
+            <a:endParaRPr lang="ru-RU" dirty="0"/>
+          </a:p>
+          <a:p>
+            <a:pPr marL="285750" indent="-285750">
+              <a:buFont typeface="Arial" panose="020B0604020202020204" pitchFamily="34" charset="0"/>
+              <a:buChar char="•"/>
+            </a:pPr>
+            <a:r>
+              <a:rPr lang="ru-RU" dirty="0"/>
+              <a:t>Добавить возможность настройки управления передвижением</a:t>
+            </a:r>
+          </a:p>
+          <a:p>
+            <a:pPr marL="285750" indent="-285750">
+              <a:buFont typeface="Arial" panose="020B0604020202020204" pitchFamily="34" charset="0"/>
+              <a:buChar char="•"/>
+            </a:pPr>
+            <a:endParaRPr lang="ru-RU" dirty="0"/>
+          </a:p>
+          <a:p>
+            <a:pPr marL="285750" indent="-285750">
+              <a:buFont typeface="Arial" panose="020B0604020202020204" pitchFamily="34" charset="0"/>
+              <a:buChar char="•"/>
+            </a:pPr>
+            <a:r>
+              <a:rPr lang="ru-RU" dirty="0"/>
+              <a:t>Добавить больше противников</a:t>
+            </a:r>
+          </a:p>
+          <a:p>
+            <a:pPr marL="285750" indent="-285750">
+              <a:buFont typeface="Arial" panose="020B0604020202020204" pitchFamily="34" charset="0"/>
+              <a:buChar char="•"/>
+            </a:pPr>
+            <a:endParaRPr lang="ru-RU" dirty="0"/>
+          </a:p>
+          <a:p>
+            <a:pPr marL="285750" indent="-285750">
+              <a:buFont typeface="Arial" panose="020B0604020202020204" pitchFamily="34" charset="0"/>
+              <a:buChar char="•"/>
+            </a:pPr>
+            <a:r>
+              <a:rPr lang="ru-RU" dirty="0"/>
+              <a:t>Добавить новые бонусы на уровнях</a:t>
+            </a:r>
+            <a:endParaRPr lang="en-US" dirty="0"/>
+          </a:p>
+          <a:p>
+            <a:pPr marL="285750" indent="-285750">
+              <a:buFont typeface="Arial" panose="020B0604020202020204" pitchFamily="34" charset="0"/>
+              <a:buChar char="•"/>
+            </a:pPr>
+            <a:endParaRPr lang="en-US" dirty="0"/>
+          </a:p>
+          <a:p>
+            <a:pPr marL="285750" indent="-285750">
+              <a:buFont typeface="Arial" panose="020B0604020202020204" pitchFamily="34" charset="0"/>
+              <a:buChar char="•"/>
+            </a:pPr>
+            <a:r>
+              <a:rPr lang="ru-RU" dirty="0"/>
+              <a:t>Улучшение графики</a:t>
+            </a:r>
+          </a:p>
+          <a:p>
+            <a:pPr marL="285750" indent="-285750">
+              <a:buFont typeface="Arial" panose="020B0604020202020204" pitchFamily="34" charset="0"/>
+              <a:buChar char="•"/>
+            </a:pPr>
+            <a:endParaRPr lang="ru-RU" dirty="0"/>
+          </a:p>
+          <a:p>
+            <a:pPr marL="285750" indent="-285750">
+              <a:buFont typeface="Arial" panose="020B0604020202020204" pitchFamily="34" charset="0"/>
+              <a:buChar char="•"/>
+            </a:pPr>
+            <a:r>
+              <a:rPr lang="ru-RU" dirty="0"/>
+              <a:t>Адаптивный интерфейс</a:t>
+            </a:r>
+          </a:p>
+          <a:p>
+            <a:pPr marL="285750" indent="-285750">
+              <a:buFont typeface="Arial" panose="020B0604020202020204" pitchFamily="34" charset="0"/>
+              <a:buChar char="•"/>
+            </a:pPr>
+            <a:endParaRPr lang="ru-RU" dirty="0"/>
+          </a:p>
+          <a:p>
+            <a:endParaRPr lang="ru-RU" dirty="0"/>
+          </a:p>
+        </p:txBody>
+      </p:sp>
+    </p:spTree>
+    <p:extLst>
+      <p:ext uri="{BB962C8B-B14F-4D97-AF65-F5344CB8AC3E}">
+        <p14:creationId xmlns:p14="http://schemas.microsoft.com/office/powerpoint/2010/main" val="1186784354"/>
+      </p:ext>
+    </p:extLst>
+  </p:cSld>
+  <p:clrMapOvr>
+    <a:masterClrMapping/>
+  </p:clrMapOvr>
+</p:sld>
+</file>
+
+<file path=ppt/slides/slide9.xml><?xml version="1.0" encoding="utf-8"?>
+<p:sld xmlns:a="http://schemas.openxmlformats.org/drawingml/2006/main" xmlns:r="http://schemas.openxmlformats.org/officeDocument/2006/relationships" xmlns:p="http://schemas.openxmlformats.org/presentationml/2006/main">
+  <p:cSld>
+    <p:spTree>
+      <p:nvGrpSpPr>
+        <p:cNvPr id="1" name=""/>
+        <p:cNvGrpSpPr/>
+        <p:nvPr/>
+      </p:nvGrpSpPr>
+      <p:grpSpPr>
+        <a:xfrm>
+          <a:off x="0" y="0"/>
+          <a:ext cx="0" cy="0"/>
+          <a:chOff x="0" y="0"/>
+          <a:chExt cx="0" cy="0"/>
+        </a:xfrm>
+      </p:grpSpPr>
+      <p:sp>
+        <p:nvSpPr>
+          <p:cNvPr id="2" name="Заголовок 1">
+            <a:extLst>
+              <a:ext uri="{FF2B5EF4-FFF2-40B4-BE49-F238E27FC236}">
+                <a16:creationId xmlns:a16="http://schemas.microsoft.com/office/drawing/2014/main" id="{3BE02F32-043C-415D-AA61-C088DF9C19B4}"/>
+              </a:ext>
+            </a:extLst>
+          </p:cNvPr>
+          <p:cNvSpPr>
+            <a:spLocks noGrp="1"/>
+          </p:cNvSpPr>
+          <p:nvPr>
+            <p:ph type="title"/>
+          </p:nvPr>
+        </p:nvSpPr>
+        <p:spPr>
+          <a:xfrm>
+            <a:off x="628650" y="205736"/>
+            <a:ext cx="7886700" cy="909492"/>
+          </a:xfrm>
+        </p:spPr>
+        <p:txBody>
+          <a:bodyPr>
             <a:normAutofit/>
           </a:bodyPr>
           <a:lstStyle/>
@@ -3700,6 +4523,137 @@
               <a:rPr lang="ru-RU" dirty="0"/>
               <a:t>Заключение</a:t>
             </a:r>
+          </a:p>
+        </p:txBody>
+      </p:sp>
+      <p:sp>
+        <p:nvSpPr>
+          <p:cNvPr id="4" name="TextBox 3">
+            <a:extLst>
+              <a:ext uri="{FF2B5EF4-FFF2-40B4-BE49-F238E27FC236}">
+                <a16:creationId xmlns:a16="http://schemas.microsoft.com/office/drawing/2014/main" id="{231D916E-0EC3-4A56-BA16-B4B104604E22}"/>
+              </a:ext>
+            </a:extLst>
+          </p:cNvPr>
+          <p:cNvSpPr txBox="1"/>
+          <p:nvPr/>
+        </p:nvSpPr>
+        <p:spPr>
+          <a:xfrm>
+            <a:off x="628650" y="1115228"/>
+            <a:ext cx="5956708" cy="3416320"/>
+          </a:xfrm>
+          <a:prstGeom prst="rect">
+            <a:avLst/>
+          </a:prstGeom>
+          <a:noFill/>
+        </p:spPr>
+        <p:txBody>
+          <a:bodyPr wrap="square" rtlCol="0">
+            <a:spAutoFit/>
+          </a:bodyPr>
+          <a:lstStyle/>
+          <a:p>
+            <a:r>
+              <a:rPr lang="ru-RU" dirty="0"/>
+              <a:t>В процессе работы над проектом мы:</a:t>
+            </a:r>
+          </a:p>
+          <a:p>
+            <a:endParaRPr lang="ru-RU" dirty="0"/>
+          </a:p>
+          <a:p>
+            <a:pPr marL="285750" indent="-285750">
+              <a:buFont typeface="Arial" panose="020B0604020202020204" pitchFamily="34" charset="0"/>
+              <a:buChar char="•"/>
+            </a:pPr>
+            <a:r>
+              <a:rPr lang="ru-RU" dirty="0"/>
+              <a:t>Изучили библиотеку </a:t>
+            </a:r>
+            <a:r>
+              <a:rPr lang="en-US" dirty="0" err="1"/>
+              <a:t>pygame</a:t>
+            </a:r>
+            <a:endParaRPr lang="en-US" dirty="0"/>
+          </a:p>
+          <a:p>
+            <a:pPr marL="285750" indent="-285750">
+              <a:buFont typeface="Arial" panose="020B0604020202020204" pitchFamily="34" charset="0"/>
+              <a:buChar char="•"/>
+            </a:pPr>
+            <a:endParaRPr lang="en-US" dirty="0"/>
+          </a:p>
+          <a:p>
+            <a:pPr marL="285750" indent="-285750">
+              <a:buFont typeface="Arial" panose="020B0604020202020204" pitchFamily="34" charset="0"/>
+              <a:buChar char="•"/>
+            </a:pPr>
+            <a:r>
+              <a:rPr lang="ru-RU" dirty="0"/>
+              <a:t>Приобрели навыки командной работы с </a:t>
+            </a:r>
+            <a:r>
+              <a:rPr lang="en-US" dirty="0"/>
+              <a:t>git</a:t>
+            </a:r>
+            <a:endParaRPr lang="ru-RU" dirty="0"/>
+          </a:p>
+          <a:p>
+            <a:pPr marL="285750" indent="-285750">
+              <a:buFont typeface="Arial" panose="020B0604020202020204" pitchFamily="34" charset="0"/>
+              <a:buChar char="•"/>
+            </a:pPr>
+            <a:endParaRPr lang="ru-RU" dirty="0"/>
+          </a:p>
+          <a:p>
+            <a:pPr marL="285750" indent="-285750">
+              <a:buFont typeface="Arial" panose="020B0604020202020204" pitchFamily="34" charset="0"/>
+              <a:buChar char="•"/>
+            </a:pPr>
+            <a:r>
+              <a:rPr lang="ru-RU" dirty="0"/>
+              <a:t>Создали свою игру</a:t>
+            </a:r>
+          </a:p>
+          <a:p>
+            <a:pPr marL="285750" indent="-285750">
+              <a:buFont typeface="Arial" panose="020B0604020202020204" pitchFamily="34" charset="0"/>
+              <a:buChar char="•"/>
+            </a:pPr>
+            <a:endParaRPr lang="ru-RU" dirty="0"/>
+          </a:p>
+          <a:p>
+            <a:pPr marL="285750" indent="-285750">
+              <a:buFont typeface="Arial" panose="020B0604020202020204" pitchFamily="34" charset="0"/>
+              <a:buChar char="•"/>
+            </a:pPr>
+            <a:r>
+              <a:rPr lang="ru-RU" dirty="0"/>
+              <a:t>Научились работать со спрайтами</a:t>
+            </a:r>
+            <a:endParaRPr lang="en-US" dirty="0"/>
+          </a:p>
+          <a:p>
+            <a:pPr marL="285750" indent="-285750">
+              <a:buFont typeface="Arial" panose="020B0604020202020204" pitchFamily="34" charset="0"/>
+              <a:buChar char="•"/>
+            </a:pPr>
+            <a:endParaRPr lang="en-US" dirty="0"/>
+          </a:p>
+          <a:p>
+            <a:r>
+              <a:rPr lang="ru-RU" dirty="0"/>
+              <a:t>Мы остались довольны результатом проделанной работы. </a:t>
+            </a:r>
+            <a:endParaRPr lang="en-US" dirty="0"/>
+          </a:p>
+          <a:p>
+            <a:pPr marL="285750" indent="-285750">
+              <a:buFont typeface="Arial" panose="020B0604020202020204" pitchFamily="34" charset="0"/>
+              <a:buChar char="•"/>
+            </a:pPr>
+            <a:endParaRPr lang="ru-RU" dirty="0"/>
           </a:p>
         </p:txBody>
       </p:sp>

</xml_diff>